<commit_message>
[update slides  of RILL]
</commit_message>
<xml_diff>
--- a/assets/pdf/rill_oral.pptx
+++ b/assets/pdf/rill_oral.pptx
@@ -230,7 +230,7 @@
           <a:p>
             <a:fld id="{3FACF375-A96D-0444-8D90-3C0220075668}" type="datetimeFigureOut">
               <a:rPr kumimoji="1" lang="zh-CN" altLang="en-US" smtClean="0"/>
-              <a:t>2023/11/21</a:t>
+              <a:t>2024/1/31</a:t>
             </a:fld>
             <a:endParaRPr kumimoji="1" lang="zh-CN" altLang="en-US"/>
           </a:p>
@@ -407,7 +407,7 @@
           <a:p>
             <a:fld id="{7AA7A3B3-44AE-4BB6-BF11-7EB7779EBBDB}" type="datetimeFigureOut">
               <a:rPr lang="zh-CN" altLang="en-US" smtClean="0"/>
-              <a:t>2023/11/21</a:t>
+              <a:t>2024/1/31</a:t>
             </a:fld>
             <a:endParaRPr lang="zh-CN" altLang="en-US"/>
           </a:p>
@@ -8580,36 +8580,6 @@
           </a:p>
         </p:txBody>
       </p:sp>
-      <p:pic>
-        <p:nvPicPr>
-          <p:cNvPr id="11" name="图片 10">
-            <a:extLst>
-              <a:ext uri="{FF2B5EF4-FFF2-40B4-BE49-F238E27FC236}">
-                <a16:creationId xmlns:a16="http://schemas.microsoft.com/office/drawing/2014/main" id="{E242BCBB-FADC-F34C-84B3-D21C9D50E23F}"/>
-              </a:ext>
-            </a:extLst>
-          </p:cNvPr>
-          <p:cNvPicPr>
-            <a:picLocks noChangeAspect="1"/>
-          </p:cNvPicPr>
-          <p:nvPr/>
-        </p:nvPicPr>
-        <p:blipFill>
-          <a:blip r:embed="rId3"/>
-          <a:stretch>
-            <a:fillRect/>
-          </a:stretch>
-        </p:blipFill>
-        <p:spPr>
-          <a:xfrm>
-            <a:off x="4566730" y="3336528"/>
-            <a:ext cx="4298535" cy="695752"/>
-          </a:xfrm>
-          <a:prstGeom prst="rect">
-            <a:avLst/>
-          </a:prstGeom>
-        </p:spPr>
-      </p:pic>
       <p:sp>
         <p:nvSpPr>
           <p:cNvPr id="15" name="文本框 14">
@@ -8723,6 +8693,36 @@
           </a:p>
         </p:txBody>
       </p:sp>
+      <p:pic>
+        <p:nvPicPr>
+          <p:cNvPr id="6" name="图片 5">
+            <a:extLst>
+              <a:ext uri="{FF2B5EF4-FFF2-40B4-BE49-F238E27FC236}">
+                <a16:creationId xmlns:a16="http://schemas.microsoft.com/office/drawing/2014/main" id="{3D7C2A6D-0326-CC45-8438-A6105EE9B4CB}"/>
+              </a:ext>
+            </a:extLst>
+          </p:cNvPr>
+          <p:cNvPicPr>
+            <a:picLocks noChangeAspect="1"/>
+          </p:cNvPicPr>
+          <p:nvPr/>
+        </p:nvPicPr>
+        <p:blipFill>
+          <a:blip r:embed="rId3"/>
+          <a:stretch>
+            <a:fillRect/>
+          </a:stretch>
+        </p:blipFill>
+        <p:spPr>
+          <a:xfrm>
+            <a:off x="4271183" y="3271145"/>
+            <a:ext cx="4879650" cy="796581"/>
+          </a:xfrm>
+          <a:prstGeom prst="rect">
+            <a:avLst/>
+          </a:prstGeom>
+        </p:spPr>
+      </p:pic>
     </p:spTree>
     <p:extLst>
       <p:ext uri="{BB962C8B-B14F-4D97-AF65-F5344CB8AC3E}">

</xml_diff>

<commit_message>
Deploying to gh-pages from @ Hao-Yuan-He/Hao-Yuan-He.github.io@dc0e96babfd5241100c04cdc88a091f016e4aee3 🚀
</commit_message>
<xml_diff>
--- a/assets/pdf/rill_oral.pptx
+++ b/assets/pdf/rill_oral.pptx
@@ -230,7 +230,7 @@
           <a:p>
             <a:fld id="{3FACF375-A96D-0444-8D90-3C0220075668}" type="datetimeFigureOut">
               <a:rPr kumimoji="1" lang="zh-CN" altLang="en-US" smtClean="0"/>
-              <a:t>2023/11/21</a:t>
+              <a:t>2024/1/31</a:t>
             </a:fld>
             <a:endParaRPr kumimoji="1" lang="zh-CN" altLang="en-US"/>
           </a:p>
@@ -407,7 +407,7 @@
           <a:p>
             <a:fld id="{7AA7A3B3-44AE-4BB6-BF11-7EB7779EBBDB}" type="datetimeFigureOut">
               <a:rPr lang="zh-CN" altLang="en-US" smtClean="0"/>
-              <a:t>2023/11/21</a:t>
+              <a:t>2024/1/31</a:t>
             </a:fld>
             <a:endParaRPr lang="zh-CN" altLang="en-US"/>
           </a:p>
@@ -8580,36 +8580,6 @@
           </a:p>
         </p:txBody>
       </p:sp>
-      <p:pic>
-        <p:nvPicPr>
-          <p:cNvPr id="11" name="图片 10">
-            <a:extLst>
-              <a:ext uri="{FF2B5EF4-FFF2-40B4-BE49-F238E27FC236}">
-                <a16:creationId xmlns:a16="http://schemas.microsoft.com/office/drawing/2014/main" id="{E242BCBB-FADC-F34C-84B3-D21C9D50E23F}"/>
-              </a:ext>
-            </a:extLst>
-          </p:cNvPr>
-          <p:cNvPicPr>
-            <a:picLocks noChangeAspect="1"/>
-          </p:cNvPicPr>
-          <p:nvPr/>
-        </p:nvPicPr>
-        <p:blipFill>
-          <a:blip r:embed="rId3"/>
-          <a:stretch>
-            <a:fillRect/>
-          </a:stretch>
-        </p:blipFill>
-        <p:spPr>
-          <a:xfrm>
-            <a:off x="4566730" y="3336528"/>
-            <a:ext cx="4298535" cy="695752"/>
-          </a:xfrm>
-          <a:prstGeom prst="rect">
-            <a:avLst/>
-          </a:prstGeom>
-        </p:spPr>
-      </p:pic>
       <p:sp>
         <p:nvSpPr>
           <p:cNvPr id="15" name="文本框 14">
@@ -8723,6 +8693,36 @@
           </a:p>
         </p:txBody>
       </p:sp>
+      <p:pic>
+        <p:nvPicPr>
+          <p:cNvPr id="6" name="图片 5">
+            <a:extLst>
+              <a:ext uri="{FF2B5EF4-FFF2-40B4-BE49-F238E27FC236}">
+                <a16:creationId xmlns:a16="http://schemas.microsoft.com/office/drawing/2014/main" id="{3D7C2A6D-0326-CC45-8438-A6105EE9B4CB}"/>
+              </a:ext>
+            </a:extLst>
+          </p:cNvPr>
+          <p:cNvPicPr>
+            <a:picLocks noChangeAspect="1"/>
+          </p:cNvPicPr>
+          <p:nvPr/>
+        </p:nvPicPr>
+        <p:blipFill>
+          <a:blip r:embed="rId3"/>
+          <a:stretch>
+            <a:fillRect/>
+          </a:stretch>
+        </p:blipFill>
+        <p:spPr>
+          <a:xfrm>
+            <a:off x="4271183" y="3271145"/>
+            <a:ext cx="4879650" cy="796581"/>
+          </a:xfrm>
+          <a:prstGeom prst="rect">
+            <a:avLst/>
+          </a:prstGeom>
+        </p:spPr>
+      </p:pic>
     </p:spTree>
     <p:extLst>
       <p:ext uri="{BB962C8B-B14F-4D97-AF65-F5344CB8AC3E}">

</xml_diff>